<commit_message>
managed to stop the mole after game ends
</commit_message>
<xml_diff>
--- a/project 1/Presentation1.pptx
+++ b/project 1/Presentation1.pptx
@@ -113,6 +113,14 @@
 </p:presentation>
 </file>
 
+<file path=ppt/revisionInfo.xml><?xml version="1.0" encoding="utf-8"?>
+<p1510:revInfo xmlns:a="http://schemas.openxmlformats.org/drawingml/2006/main" xmlns:r="http://schemas.openxmlformats.org/officeDocument/2006/relationships" xmlns:p1510="http://schemas.microsoft.com/office/powerpoint/2015/10/main">
+  <p1510:revLst>
+    <p1510:client id="{B99757A0-AC1F-48F0-B81C-FCC564D7B102}" v="2" dt="2023-06-20T09:15:16.544"/>
+  </p1510:revLst>
+</p1510:revInfo>
+</file>
+
 <file path=ppt/changesInfos/changesInfo1.xml><?xml version="1.0" encoding="utf-8"?>
 <pc:chgInfo xmlns:a="http://schemas.openxmlformats.org/drawingml/2006/main" xmlns:r="http://schemas.openxmlformats.org/officeDocument/2006/relationships" xmlns:ac="http://schemas.microsoft.com/office/drawing/2013/main/command" xmlns:pc="http://schemas.microsoft.com/office/powerpoint/2013/main/command">
   <pc:docChgLst>
@@ -147,6 +155,38 @@
       </pc:sldChg>
     </pc:docChg>
   </pc:docChgLst>
+  <pc:docChgLst>
+    <pc:chgData name="firdaus sulaiman" userId="f8b52cf654c9971f" providerId="LiveId" clId="{B99757A0-AC1F-48F0-B81C-FCC564D7B102}"/>
+    <pc:docChg chg="modSld">
+      <pc:chgData name="firdaus sulaiman" userId="f8b52cf654c9971f" providerId="LiveId" clId="{B99757A0-AC1F-48F0-B81C-FCC564D7B102}" dt="2023-06-20T09:15:27.336" v="2" actId="20577"/>
+      <pc:docMkLst>
+        <pc:docMk/>
+      </pc:docMkLst>
+      <pc:sldChg chg="addSp modSp mod setBg">
+        <pc:chgData name="firdaus sulaiman" userId="f8b52cf654c9971f" providerId="LiveId" clId="{B99757A0-AC1F-48F0-B81C-FCC564D7B102}" dt="2023-06-20T09:15:27.336" v="2" actId="20577"/>
+        <pc:sldMkLst>
+          <pc:docMk/>
+          <pc:sldMk cId="1050264481" sldId="257"/>
+        </pc:sldMkLst>
+        <pc:spChg chg="add mod">
+          <ac:chgData name="firdaus sulaiman" userId="f8b52cf654c9971f" providerId="LiveId" clId="{B99757A0-AC1F-48F0-B81C-FCC564D7B102}" dt="2023-06-20T09:15:14.091" v="0" actId="767"/>
+          <ac:spMkLst>
+            <pc:docMk/>
+            <pc:sldMk cId="1050264481" sldId="257"/>
+            <ac:spMk id="2" creationId="{2B1141BB-AEF0-397C-DA3E-6DB6857449FB}"/>
+          </ac:spMkLst>
+        </pc:spChg>
+        <pc:spChg chg="add mod">
+          <ac:chgData name="firdaus sulaiman" userId="f8b52cf654c9971f" providerId="LiveId" clId="{B99757A0-AC1F-48F0-B81C-FCC564D7B102}" dt="2023-06-20T09:15:27.336" v="2" actId="20577"/>
+          <ac:spMkLst>
+            <pc:docMk/>
+            <pc:sldMk cId="1050264481" sldId="257"/>
+            <ac:spMk id="3" creationId="{4700499F-C265-F1C6-3F3C-849CF5DAAD43}"/>
+          </ac:spMkLst>
+        </pc:spChg>
+      </pc:sldChg>
+    </pc:docChg>
+  </pc:docChgLst>
 </pc:chgInfo>
 </file>
 
@@ -299,7 +339,7 @@
           <a:p>
             <a:fld id="{CDBA4B56-B257-47D0-BBC2-4C879550A008}" type="datetimeFigureOut">
               <a:rPr lang="en-SG" smtClean="0"/>
-              <a:t>13/6/2023</a:t>
+              <a:t>20/6/2023</a:t>
             </a:fld>
             <a:endParaRPr lang="en-SG"/>
           </a:p>
@@ -499,7 +539,7 @@
           <a:p>
             <a:fld id="{CDBA4B56-B257-47D0-BBC2-4C879550A008}" type="datetimeFigureOut">
               <a:rPr lang="en-SG" smtClean="0"/>
-              <a:t>13/6/2023</a:t>
+              <a:t>20/6/2023</a:t>
             </a:fld>
             <a:endParaRPr lang="en-SG"/>
           </a:p>
@@ -709,7 +749,7 @@
           <a:p>
             <a:fld id="{CDBA4B56-B257-47D0-BBC2-4C879550A008}" type="datetimeFigureOut">
               <a:rPr lang="en-SG" smtClean="0"/>
-              <a:t>13/6/2023</a:t>
+              <a:t>20/6/2023</a:t>
             </a:fld>
             <a:endParaRPr lang="en-SG"/>
           </a:p>
@@ -909,7 +949,7 @@
           <a:p>
             <a:fld id="{CDBA4B56-B257-47D0-BBC2-4C879550A008}" type="datetimeFigureOut">
               <a:rPr lang="en-SG" smtClean="0"/>
-              <a:t>13/6/2023</a:t>
+              <a:t>20/6/2023</a:t>
             </a:fld>
             <a:endParaRPr lang="en-SG"/>
           </a:p>
@@ -1185,7 +1225,7 @@
           <a:p>
             <a:fld id="{CDBA4B56-B257-47D0-BBC2-4C879550A008}" type="datetimeFigureOut">
               <a:rPr lang="en-SG" smtClean="0"/>
-              <a:t>13/6/2023</a:t>
+              <a:t>20/6/2023</a:t>
             </a:fld>
             <a:endParaRPr lang="en-SG"/>
           </a:p>
@@ -1453,7 +1493,7 @@
           <a:p>
             <a:fld id="{CDBA4B56-B257-47D0-BBC2-4C879550A008}" type="datetimeFigureOut">
               <a:rPr lang="en-SG" smtClean="0"/>
-              <a:t>13/6/2023</a:t>
+              <a:t>20/6/2023</a:t>
             </a:fld>
             <a:endParaRPr lang="en-SG"/>
           </a:p>
@@ -1868,7 +1908,7 @@
           <a:p>
             <a:fld id="{CDBA4B56-B257-47D0-BBC2-4C879550A008}" type="datetimeFigureOut">
               <a:rPr lang="en-SG" smtClean="0"/>
-              <a:t>13/6/2023</a:t>
+              <a:t>20/6/2023</a:t>
             </a:fld>
             <a:endParaRPr lang="en-SG"/>
           </a:p>
@@ -2010,7 +2050,7 @@
           <a:p>
             <a:fld id="{CDBA4B56-B257-47D0-BBC2-4C879550A008}" type="datetimeFigureOut">
               <a:rPr lang="en-SG" smtClean="0"/>
-              <a:t>13/6/2023</a:t>
+              <a:t>20/6/2023</a:t>
             </a:fld>
             <a:endParaRPr lang="en-SG"/>
           </a:p>
@@ -2123,7 +2163,7 @@
           <a:p>
             <a:fld id="{CDBA4B56-B257-47D0-BBC2-4C879550A008}" type="datetimeFigureOut">
               <a:rPr lang="en-SG" smtClean="0"/>
-              <a:t>13/6/2023</a:t>
+              <a:t>20/6/2023</a:t>
             </a:fld>
             <a:endParaRPr lang="en-SG"/>
           </a:p>
@@ -2436,7 +2476,7 @@
           <a:p>
             <a:fld id="{CDBA4B56-B257-47D0-BBC2-4C879550A008}" type="datetimeFigureOut">
               <a:rPr lang="en-SG" smtClean="0"/>
-              <a:t>13/6/2023</a:t>
+              <a:t>20/6/2023</a:t>
             </a:fld>
             <a:endParaRPr lang="en-SG"/>
           </a:p>
@@ -2725,7 +2765,7 @@
           <a:p>
             <a:fld id="{CDBA4B56-B257-47D0-BBC2-4C879550A008}" type="datetimeFigureOut">
               <a:rPr lang="en-SG" smtClean="0"/>
-              <a:t>13/6/2023</a:t>
+              <a:t>20/6/2023</a:t>
             </a:fld>
             <a:endParaRPr lang="en-SG"/>
           </a:p>
@@ -2968,7 +3008,7 @@
           <a:p>
             <a:fld id="{CDBA4B56-B257-47D0-BBC2-4C879550A008}" type="datetimeFigureOut">
               <a:rPr lang="en-SG" smtClean="0"/>
-              <a:t>13/6/2023</a:t>
+              <a:t>20/6/2023</a:t>
             </a:fld>
             <a:endParaRPr lang="en-SG"/>
           </a:p>
@@ -4157,6 +4197,12 @@
 <file path=ppt/slides/slide2.xml><?xml version="1.0" encoding="utf-8"?>
 <p:sld xmlns:a="http://schemas.openxmlformats.org/drawingml/2006/main" xmlns:r="http://schemas.openxmlformats.org/officeDocument/2006/relationships" xmlns:p="http://schemas.openxmlformats.org/presentationml/2006/main">
   <p:cSld>
+    <p:bg>
+      <p:bgPr>
+        <a:noFill/>
+        <a:effectLst/>
+      </p:bgPr>
+    </p:bg>
     <p:spTree>
       <p:nvGrpSpPr>
         <p:cNvPr id="1" name=""/>
@@ -4171,6 +4217,254 @@
           <a:chExt cx="0" cy="0"/>
         </a:xfrm>
       </p:grpSpPr>
+      <p:sp>
+        <p:nvSpPr>
+          <p:cNvPr id="2" name="TextBox 1">
+            <a:extLst>
+              <a:ext uri="{FF2B5EF4-FFF2-40B4-BE49-F238E27FC236}">
+                <a16:creationId xmlns:a16="http://schemas.microsoft.com/office/drawing/2014/main" id="{2B1141BB-AEF0-397C-DA3E-6DB6857449FB}"/>
+              </a:ext>
+            </a:extLst>
+          </p:cNvPr>
+          <p:cNvSpPr txBox="1"/>
+          <p:nvPr/>
+        </p:nvSpPr>
+        <p:spPr>
+          <a:xfrm>
+            <a:off x="577049" y="532660"/>
+            <a:ext cx="184731" cy="369332"/>
+          </a:xfrm>
+          <a:prstGeom prst="rect">
+            <a:avLst/>
+          </a:prstGeom>
+          <a:noFill/>
+        </p:spPr>
+        <p:txBody>
+          <a:bodyPr wrap="none" rtlCol="0">
+            <a:spAutoFit/>
+          </a:bodyPr>
+          <a:lstStyle/>
+          <a:p>
+            <a:endParaRPr lang="en-US" dirty="0"/>
+          </a:p>
+        </p:txBody>
+      </p:sp>
+      <p:sp>
+        <p:nvSpPr>
+          <p:cNvPr id="3" name="Rectangle 2">
+            <a:extLst>
+              <a:ext uri="{FF2B5EF4-FFF2-40B4-BE49-F238E27FC236}">
+                <a16:creationId xmlns:a16="http://schemas.microsoft.com/office/drawing/2014/main" id="{4700499F-C265-F1C6-3F3C-849CF5DAAD43}"/>
+              </a:ext>
+            </a:extLst>
+          </p:cNvPr>
+          <p:cNvSpPr>
+            <a:spLocks noChangeArrowheads="1"/>
+          </p:cNvSpPr>
+          <p:nvPr/>
+        </p:nvSpPr>
+        <p:spPr bwMode="auto">
+          <a:xfrm>
+            <a:off x="0" y="-138499"/>
+            <a:ext cx="65" cy="276999"/>
+          </a:xfrm>
+          <a:prstGeom prst="rect">
+            <a:avLst/>
+          </a:prstGeom>
+          <a:solidFill>
+            <a:srgbClr val="F7F7F8"/>
+          </a:solidFill>
+          <a:ln>
+            <a:noFill/>
+          </a:ln>
+          <a:effectLst/>
+          <a:extLst>
+            <a:ext uri="{91240B29-F687-4F45-9708-019B960494DF}">
+              <a14:hiddenLine xmlns:a14="http://schemas.microsoft.com/office/drawing/2010/main" w="9525">
+                <a:solidFill>
+                  <a:schemeClr val="tx1"/>
+                </a:solidFill>
+                <a:miter lim="800000"/>
+                <a:headEnd/>
+                <a:tailEnd/>
+              </a14:hiddenLine>
+            </a:ext>
+            <a:ext uri="{AF507438-7753-43E0-B8FC-AC1667EBCBE1}">
+              <a14:hiddenEffects xmlns:a14="http://schemas.microsoft.com/office/drawing/2010/main">
+                <a:effectLst>
+                  <a:outerShdw dist="35921" dir="2700000" algn="ctr" rotWithShape="0">
+                    <a:schemeClr val="bg2"/>
+                  </a:outerShdw>
+                </a:effectLst>
+              </a14:hiddenEffects>
+            </a:ext>
+          </a:extLst>
+        </p:spPr>
+        <p:txBody>
+          <a:bodyPr vert="horz" wrap="none" lIns="0" tIns="0" rIns="0" bIns="0" numCol="1" anchor="ctr" anchorCtr="0" compatLnSpc="1">
+            <a:prstTxWarp prst="textNoShape">
+              <a:avLst/>
+            </a:prstTxWarp>
+            <a:spAutoFit/>
+          </a:bodyPr>
+          <a:lstStyle>
+            <a:lvl1pPr eaLnBrk="0" fontAlgn="base" hangingPunct="0">
+              <a:spcBef>
+                <a:spcPct val="0"/>
+              </a:spcBef>
+              <a:spcAft>
+                <a:spcPct val="0"/>
+              </a:spcAft>
+              <a:defRPr>
+                <a:solidFill>
+                  <a:schemeClr val="tx1"/>
+                </a:solidFill>
+                <a:latin typeface="Arial" panose="020B0604020202020204" pitchFamily="34" charset="0"/>
+              </a:defRPr>
+            </a:lvl1pPr>
+            <a:lvl2pPr eaLnBrk="0" fontAlgn="base" hangingPunct="0">
+              <a:spcBef>
+                <a:spcPct val="0"/>
+              </a:spcBef>
+              <a:spcAft>
+                <a:spcPct val="0"/>
+              </a:spcAft>
+              <a:defRPr>
+                <a:solidFill>
+                  <a:schemeClr val="tx1"/>
+                </a:solidFill>
+                <a:latin typeface="Arial" panose="020B0604020202020204" pitchFamily="34" charset="0"/>
+              </a:defRPr>
+            </a:lvl2pPr>
+            <a:lvl3pPr eaLnBrk="0" fontAlgn="base" hangingPunct="0">
+              <a:spcBef>
+                <a:spcPct val="0"/>
+              </a:spcBef>
+              <a:spcAft>
+                <a:spcPct val="0"/>
+              </a:spcAft>
+              <a:defRPr>
+                <a:solidFill>
+                  <a:schemeClr val="tx1"/>
+                </a:solidFill>
+                <a:latin typeface="Arial" panose="020B0604020202020204" pitchFamily="34" charset="0"/>
+              </a:defRPr>
+            </a:lvl3pPr>
+            <a:lvl4pPr eaLnBrk="0" fontAlgn="base" hangingPunct="0">
+              <a:spcBef>
+                <a:spcPct val="0"/>
+              </a:spcBef>
+              <a:spcAft>
+                <a:spcPct val="0"/>
+              </a:spcAft>
+              <a:defRPr>
+                <a:solidFill>
+                  <a:schemeClr val="tx1"/>
+                </a:solidFill>
+                <a:latin typeface="Arial" panose="020B0604020202020204" pitchFamily="34" charset="0"/>
+              </a:defRPr>
+            </a:lvl4pPr>
+            <a:lvl5pPr eaLnBrk="0" fontAlgn="base" hangingPunct="0">
+              <a:spcBef>
+                <a:spcPct val="0"/>
+              </a:spcBef>
+              <a:spcAft>
+                <a:spcPct val="0"/>
+              </a:spcAft>
+              <a:defRPr>
+                <a:solidFill>
+                  <a:schemeClr val="tx1"/>
+                </a:solidFill>
+                <a:latin typeface="Arial" panose="020B0604020202020204" pitchFamily="34" charset="0"/>
+              </a:defRPr>
+            </a:lvl5pPr>
+            <a:lvl6pPr eaLnBrk="0" fontAlgn="base" hangingPunct="0">
+              <a:spcBef>
+                <a:spcPct val="0"/>
+              </a:spcBef>
+              <a:spcAft>
+                <a:spcPct val="0"/>
+              </a:spcAft>
+              <a:defRPr>
+                <a:solidFill>
+                  <a:schemeClr val="tx1"/>
+                </a:solidFill>
+                <a:latin typeface="Arial" panose="020B0604020202020204" pitchFamily="34" charset="0"/>
+              </a:defRPr>
+            </a:lvl6pPr>
+            <a:lvl7pPr eaLnBrk="0" fontAlgn="base" hangingPunct="0">
+              <a:spcBef>
+                <a:spcPct val="0"/>
+              </a:spcBef>
+              <a:spcAft>
+                <a:spcPct val="0"/>
+              </a:spcAft>
+              <a:defRPr>
+                <a:solidFill>
+                  <a:schemeClr val="tx1"/>
+                </a:solidFill>
+                <a:latin typeface="Arial" panose="020B0604020202020204" pitchFamily="34" charset="0"/>
+              </a:defRPr>
+            </a:lvl7pPr>
+            <a:lvl8pPr eaLnBrk="0" fontAlgn="base" hangingPunct="0">
+              <a:spcBef>
+                <a:spcPct val="0"/>
+              </a:spcBef>
+              <a:spcAft>
+                <a:spcPct val="0"/>
+              </a:spcAft>
+              <a:defRPr>
+                <a:solidFill>
+                  <a:schemeClr val="tx1"/>
+                </a:solidFill>
+                <a:latin typeface="Arial" panose="020B0604020202020204" pitchFamily="34" charset="0"/>
+              </a:defRPr>
+            </a:lvl8pPr>
+            <a:lvl9pPr eaLnBrk="0" fontAlgn="base" hangingPunct="0">
+              <a:spcBef>
+                <a:spcPct val="0"/>
+              </a:spcBef>
+              <a:spcAft>
+                <a:spcPct val="0"/>
+              </a:spcAft>
+              <a:defRPr>
+                <a:solidFill>
+                  <a:schemeClr val="tx1"/>
+                </a:solidFill>
+                <a:latin typeface="Arial" panose="020B0604020202020204" pitchFamily="34" charset="0"/>
+              </a:defRPr>
+            </a:lvl9pPr>
+          </a:lstStyle>
+          <a:p>
+            <a:pPr marL="0" marR="0" lvl="0" indent="0" algn="l" defTabSz="914400" rtl="0" eaLnBrk="0" fontAlgn="base" latinLnBrk="0" hangingPunct="0">
+              <a:lnSpc>
+                <a:spcPct val="100000"/>
+              </a:lnSpc>
+              <a:spcBef>
+                <a:spcPct val="0"/>
+              </a:spcBef>
+              <a:spcAft>
+                <a:spcPct val="0"/>
+              </a:spcAft>
+              <a:buClrTx/>
+              <a:buSzTx/>
+              <a:buFontTx/>
+              <a:buNone/>
+              <a:tabLst/>
+            </a:pPr>
+            <a:endParaRPr kumimoji="0" lang="en-US" altLang="en-US" sz="1800" b="0" i="0" u="none" strike="noStrike" cap="none" normalizeH="0" baseline="0" dirty="0">
+              <a:ln>
+                <a:noFill/>
+              </a:ln>
+              <a:solidFill>
+                <a:schemeClr val="tx1"/>
+              </a:solidFill>
+              <a:effectLst/>
+              <a:latin typeface="Arial" panose="020B0604020202020204" pitchFamily="34" charset="0"/>
+            </a:endParaRPr>
+          </a:p>
+        </p:txBody>
+      </p:sp>
     </p:spTree>
     <p:extLst>
       <p:ext uri="{BB962C8B-B14F-4D97-AF65-F5344CB8AC3E}">
@@ -4480,20 +4774,20 @@
 </file>
 
 <file path=customXml/item1.xml><?xml version="1.0" encoding="utf-8"?>
+<p:properties xmlns:p="http://schemas.microsoft.com/office/2006/metadata/properties" xmlns:xsi="http://www.w3.org/2001/XMLSchema-instance" xmlns:pc="http://schemas.microsoft.com/office/infopath/2007/PartnerControls">
+  <documentManagement>
+    <_activity xmlns="892be37c-2ae3-4e1b-b9ea-4491d00e22dd" xsi:nil="true"/>
+  </documentManagement>
+</p:properties>
+</file>
+
+<file path=customXml/item2.xml><?xml version="1.0" encoding="utf-8"?>
 <?mso-contentType ?>
 <FormTemplates xmlns="http://schemas.microsoft.com/sharepoint/v3/contenttype/forms">
   <Display>DocumentLibraryForm</Display>
   <Edit>DocumentLibraryForm</Edit>
   <New>DocumentLibraryForm</New>
 </FormTemplates>
-</file>
-
-<file path=customXml/item2.xml><?xml version="1.0" encoding="utf-8"?>
-<p:properties xmlns:p="http://schemas.microsoft.com/office/2006/metadata/properties" xmlns:xsi="http://www.w3.org/2001/XMLSchema-instance" xmlns:pc="http://schemas.microsoft.com/office/infopath/2007/PartnerControls">
-  <documentManagement>
-    <_activity xmlns="892be37c-2ae3-4e1b-b9ea-4491d00e22dd" xsi:nil="true"/>
-  </documentManagement>
-</p:properties>
 </file>
 
 <file path=customXml/item3.xml><?xml version="1.0" encoding="utf-8"?>
@@ -4718,14 +5012,6 @@
 </file>
 
 <file path=customXml/itemProps1.xml><?xml version="1.0" encoding="utf-8"?>
-<ds:datastoreItem xmlns:ds="http://schemas.openxmlformats.org/officeDocument/2006/customXml" ds:itemID="{7B6FE46A-C040-49D8-B9C8-4F3DFA69F344}">
-  <ds:schemaRefs>
-    <ds:schemaRef ds:uri="http://schemas.microsoft.com/sharepoint/v3/contenttype/forms"/>
-  </ds:schemaRefs>
-</ds:datastoreItem>
-</file>
-
-<file path=customXml/itemProps2.xml><?xml version="1.0" encoding="utf-8"?>
 <ds:datastoreItem xmlns:ds="http://schemas.openxmlformats.org/officeDocument/2006/customXml" ds:itemID="{41B9F7C1-373A-4BC9-B82F-88B339DA0815}">
   <ds:schemaRefs>
     <ds:schemaRef ds:uri="http://schemas.microsoft.com/office/infopath/2007/PartnerControls"/>
@@ -4738,6 +5024,14 @@
     <ds:schemaRef ds:uri="http://schemas.openxmlformats.org/package/2006/metadata/core-properties"/>
     <ds:schemaRef ds:uri="http://schemas.microsoft.com/office/2006/metadata/properties"/>
     <ds:schemaRef ds:uri="http://purl.org/dc/dcmitype/"/>
+  </ds:schemaRefs>
+</ds:datastoreItem>
+</file>
+
+<file path=customXml/itemProps2.xml><?xml version="1.0" encoding="utf-8"?>
+<ds:datastoreItem xmlns:ds="http://schemas.openxmlformats.org/officeDocument/2006/customXml" ds:itemID="{7B6FE46A-C040-49D8-B9C8-4F3DFA69F344}">
+  <ds:schemaRefs>
+    <ds:schemaRef ds:uri="http://schemas.microsoft.com/sharepoint/v3/contenttype/forms"/>
   </ds:schemaRefs>
 </ds:datastoreItem>
 </file>

</xml_diff>